<commit_message>
Add 'no entry' and 'photography here' signs
</commit_message>
<xml_diff>
--- a/signs/signs.pptx
+++ b/signs/signs.pptx
@@ -5,17 +5,18 @@
     <p:sldMasterId id="2147483648" r:id="rId1"/>
   </p:sldMasterIdLst>
   <p:notesMasterIdLst>
-    <p:notesMasterId r:id="rId10"/>
+    <p:notesMasterId r:id="rId11"/>
   </p:notesMasterIdLst>
   <p:sldIdLst>
     <p:sldId id="258" r:id="rId2"/>
-    <p:sldId id="262" r:id="rId3"/>
-    <p:sldId id="264" r:id="rId4"/>
-    <p:sldId id="267" r:id="rId5"/>
-    <p:sldId id="270" r:id="rId6"/>
-    <p:sldId id="269" r:id="rId7"/>
-    <p:sldId id="266" r:id="rId8"/>
-    <p:sldId id="265" r:id="rId9"/>
+    <p:sldId id="271" r:id="rId3"/>
+    <p:sldId id="262" r:id="rId4"/>
+    <p:sldId id="264" r:id="rId5"/>
+    <p:sldId id="267" r:id="rId6"/>
+    <p:sldId id="270" r:id="rId7"/>
+    <p:sldId id="269" r:id="rId8"/>
+    <p:sldId id="266" r:id="rId9"/>
+    <p:sldId id="265" r:id="rId10"/>
   </p:sldIdLst>
   <p:sldSz cx="10691813" cy="7559675"/>
   <p:notesSz cx="6858000" cy="9144000"/>
@@ -1199,6 +1200,106 @@
           <a:chExt cx="0" cy="0"/>
         </a:xfrm>
       </p:grpSpPr>
+      <p:pic>
+        <p:nvPicPr>
+          <p:cNvPr id="5" name="Picture Placeholder 4" descr="A picture containing drawing, clock&#10;&#10;Description automatically generated">
+            <a:extLst>
+              <a:ext uri="{FF2B5EF4-FFF2-40B4-BE49-F238E27FC236}">
+                <a16:creationId xmlns:a16="http://schemas.microsoft.com/office/drawing/2014/main" id="{6EE661D4-7341-4250-A68A-0E85D36BB6AE}"/>
+              </a:ext>
+            </a:extLst>
+          </p:cNvPr>
+          <p:cNvPicPr preferRelativeResize="0">
+            <a:picLocks noGrp="1"/>
+          </p:cNvPicPr>
+          <p:nvPr>
+            <p:ph type="pic" sz="quarter" idx="10"/>
+          </p:nvPr>
+        </p:nvPicPr>
+        <p:blipFill>
+          <a:blip r:embed="rId2">
+            <a:extLst>
+              <a:ext uri="{28A0092B-C50C-407E-A947-70E740481C1C}">
+                <a14:useLocalDpi xmlns:a14="http://schemas.microsoft.com/office/drawing/2010/main" val="0"/>
+              </a:ext>
+            </a:extLst>
+          </a:blip>
+          <a:stretch>
+            <a:fillRect/>
+          </a:stretch>
+        </p:blipFill>
+        <p:spPr>
+          <a:xfrm>
+            <a:off x="3977113" y="2264344"/>
+            <a:ext cx="2737586" cy="2621554"/>
+          </a:xfrm>
+        </p:spPr>
+      </p:pic>
+      <p:sp>
+        <p:nvSpPr>
+          <p:cNvPr id="3" name="Text Placeholder 2">
+            <a:extLst>
+              <a:ext uri="{FF2B5EF4-FFF2-40B4-BE49-F238E27FC236}">
+                <a16:creationId xmlns:a16="http://schemas.microsoft.com/office/drawing/2014/main" id="{75D26587-D4E9-496F-A15F-FF56919961EC}"/>
+              </a:ext>
+            </a:extLst>
+          </p:cNvPr>
+          <p:cNvSpPr>
+            <a:spLocks noGrp="1"/>
+          </p:cNvSpPr>
+          <p:nvPr>
+            <p:ph type="body" sz="quarter" idx="11"/>
+          </p:nvPr>
+        </p:nvSpPr>
+        <p:spPr>
+          <a:xfrm>
+            <a:off x="2093726" y="5188851"/>
+            <a:ext cx="6504364" cy="2030816"/>
+          </a:xfrm>
+        </p:spPr>
+        <p:txBody>
+          <a:bodyPr>
+            <a:normAutofit/>
+          </a:bodyPr>
+          <a:lstStyle/>
+          <a:p>
+            <a:r>
+              <a:rPr lang="en-GB" sz="6600" dirty="0"/>
+              <a:t>PHOTOGRAPHY BEYOND THIS POINT</a:t>
+            </a:r>
+          </a:p>
+        </p:txBody>
+      </p:sp>
+    </p:spTree>
+    <p:extLst>
+      <p:ext uri="{BB962C8B-B14F-4D97-AF65-F5344CB8AC3E}">
+        <p14:creationId xmlns:p14="http://schemas.microsoft.com/office/powerpoint/2010/main" val="3549714815"/>
+      </p:ext>
+    </p:extLst>
+  </p:cSld>
+  <p:clrMapOvr>
+    <a:masterClrMapping/>
+  </p:clrMapOvr>
+</p:sld>
+</file>
+
+<file path=ppt/slides/slide3.xml><?xml version="1.0" encoding="utf-8"?>
+<p:sld xmlns:a="http://schemas.openxmlformats.org/drawingml/2006/main" xmlns:r="http://schemas.openxmlformats.org/officeDocument/2006/relationships" xmlns:p="http://schemas.openxmlformats.org/presentationml/2006/main">
+  <p:cSld>
+    <p:spTree>
+      <p:nvGrpSpPr>
+        <p:cNvPr id="1" name=""/>
+        <p:cNvGrpSpPr/>
+        <p:nvPr/>
+      </p:nvGrpSpPr>
+      <p:grpSpPr>
+        <a:xfrm>
+          <a:off x="0" y="0"/>
+          <a:ext cx="0" cy="0"/>
+          <a:chOff x="0" y="0"/>
+          <a:chExt cx="0" cy="0"/>
+        </a:xfrm>
+      </p:grpSpPr>
       <p:sp>
         <p:nvSpPr>
           <p:cNvPr id="2" name="Text Placeholder 1">
@@ -1246,7 +1347,7 @@
 </p:sld>
 </file>
 
-<file path=ppt/slides/slide3.xml><?xml version="1.0" encoding="utf-8"?>
+<file path=ppt/slides/slide4.xml><?xml version="1.0" encoding="utf-8"?>
 <p:sld xmlns:a="http://schemas.openxmlformats.org/drawingml/2006/main" xmlns:r="http://schemas.openxmlformats.org/officeDocument/2006/relationships" xmlns:p="http://schemas.openxmlformats.org/presentationml/2006/main">
   <p:cSld>
     <p:spTree>
@@ -1310,7 +1411,7 @@
 </p:sld>
 </file>
 
-<file path=ppt/slides/slide4.xml><?xml version="1.0" encoding="utf-8"?>
+<file path=ppt/slides/slide5.xml><?xml version="1.0" encoding="utf-8"?>
 <p:sld xmlns:a="http://schemas.openxmlformats.org/drawingml/2006/main" xmlns:r="http://schemas.openxmlformats.org/officeDocument/2006/relationships" xmlns:p="http://schemas.openxmlformats.org/presentationml/2006/main">
   <p:cSld>
     <p:spTree>
@@ -1374,7 +1475,7 @@
 </p:sld>
 </file>
 
-<file path=ppt/slides/slide5.xml><?xml version="1.0" encoding="utf-8"?>
+<file path=ppt/slides/slide6.xml><?xml version="1.0" encoding="utf-8"?>
 <p:sld xmlns:a="http://schemas.openxmlformats.org/drawingml/2006/main" xmlns:r="http://schemas.openxmlformats.org/officeDocument/2006/relationships" xmlns:p="http://schemas.openxmlformats.org/presentationml/2006/main">
   <p:cSld>
     <p:spTree>
@@ -1438,7 +1539,7 @@
 </p:sld>
 </file>
 
-<file path=ppt/slides/slide6.xml><?xml version="1.0" encoding="utf-8"?>
+<file path=ppt/slides/slide7.xml><?xml version="1.0" encoding="utf-8"?>
 <p:sld xmlns:a="http://schemas.openxmlformats.org/drawingml/2006/main" xmlns:r="http://schemas.openxmlformats.org/officeDocument/2006/relationships" xmlns:p="http://schemas.openxmlformats.org/presentationml/2006/main">
   <p:cSld>
     <p:spTree>
@@ -1502,7 +1603,7 @@
 </p:sld>
 </file>
 
-<file path=ppt/slides/slide7.xml><?xml version="1.0" encoding="utf-8"?>
+<file path=ppt/slides/slide8.xml><?xml version="1.0" encoding="utf-8"?>
 <p:sld xmlns:a="http://schemas.openxmlformats.org/drawingml/2006/main" xmlns:r="http://schemas.openxmlformats.org/officeDocument/2006/relationships" xmlns:p="http://schemas.openxmlformats.org/presentationml/2006/main">
   <p:cSld>
     <p:spTree>
@@ -1572,7 +1673,7 @@
 </p:sld>
 </file>
 
-<file path=ppt/slides/slide8.xml><?xml version="1.0" encoding="utf-8"?>
+<file path=ppt/slides/slide9.xml><?xml version="1.0" encoding="utf-8"?>
 <p:sld xmlns:a="http://schemas.openxmlformats.org/drawingml/2006/main" xmlns:r="http://schemas.openxmlformats.org/officeDocument/2006/relationships" xmlns:p="http://schemas.openxmlformats.org/presentationml/2006/main">
   <p:cSld>
     <p:spTree>
@@ -1602,17 +1703,19 @@
             <a:spLocks noGrp="1"/>
           </p:cNvSpPr>
           <p:nvPr>
-            <p:ph type="body" sz="quarter" idx="10"/>
+            <p:ph type="body" sz="quarter" idx="11"/>
           </p:nvPr>
         </p:nvSpPr>
         <p:spPr>
           <a:xfrm>
-            <a:off x="726281" y="2824827"/>
-            <a:ext cx="9239249" cy="3098302"/>
+            <a:off x="1400968" y="5624157"/>
+            <a:ext cx="7889875" cy="1323975"/>
           </a:xfrm>
         </p:spPr>
         <p:txBody>
-          <a:bodyPr/>
+          <a:bodyPr>
+            <a:normAutofit fontScale="62500" lnSpcReduction="20000"/>
+          </a:bodyPr>
           <a:lstStyle/>
           <a:p>
             <a:r>
@@ -1623,6 +1726,123 @@
           </a:p>
         </p:txBody>
       </p:sp>
+      <p:grpSp>
+        <p:nvGrpSpPr>
+          <p:cNvPr id="7" name="Group 6">
+            <a:extLst>
+              <a:ext uri="{FF2B5EF4-FFF2-40B4-BE49-F238E27FC236}">
+                <a16:creationId xmlns:a16="http://schemas.microsoft.com/office/drawing/2014/main" id="{FF394D0F-7A12-431B-9585-D93148523D01}"/>
+              </a:ext>
+            </a:extLst>
+          </p:cNvPr>
+          <p:cNvGrpSpPr/>
+          <p:nvPr/>
+        </p:nvGrpSpPr>
+        <p:grpSpPr>
+          <a:xfrm>
+            <a:off x="3955845" y="2240793"/>
+            <a:ext cx="2456052" cy="2454038"/>
+            <a:chOff x="3885055" y="2074526"/>
+            <a:chExt cx="2597632" cy="2595502"/>
+          </a:xfrm>
+        </p:grpSpPr>
+        <p:sp>
+          <p:nvSpPr>
+            <p:cNvPr id="4" name="Oval 3">
+              <a:extLst>
+                <a:ext uri="{FF2B5EF4-FFF2-40B4-BE49-F238E27FC236}">
+                  <a16:creationId xmlns:a16="http://schemas.microsoft.com/office/drawing/2014/main" id="{A825D0D4-9D62-4AFE-83A6-49D3AF40C275}"/>
+                </a:ext>
+              </a:extLst>
+            </p:cNvPr>
+            <p:cNvSpPr/>
+            <p:nvPr/>
+          </p:nvSpPr>
+          <p:spPr>
+            <a:xfrm>
+              <a:off x="3885055" y="2074526"/>
+              <a:ext cx="2597632" cy="2595502"/>
+            </a:xfrm>
+            <a:prstGeom prst="ellipse">
+              <a:avLst/>
+            </a:prstGeom>
+            <a:noFill/>
+            <a:ln w="317500">
+              <a:solidFill>
+                <a:srgbClr val="FF0000"/>
+              </a:solidFill>
+            </a:ln>
+          </p:spPr>
+          <p:style>
+            <a:lnRef idx="2">
+              <a:schemeClr val="accent1">
+                <a:shade val="50000"/>
+              </a:schemeClr>
+            </a:lnRef>
+            <a:fillRef idx="1">
+              <a:schemeClr val="accent1"/>
+            </a:fillRef>
+            <a:effectRef idx="0">
+              <a:schemeClr val="accent1"/>
+            </a:effectRef>
+            <a:fontRef idx="minor">
+              <a:schemeClr val="lt1"/>
+            </a:fontRef>
+          </p:style>
+          <p:txBody>
+            <a:bodyPr rtlCol="0" anchor="ctr"/>
+            <a:lstStyle/>
+            <a:p>
+              <a:pPr algn="ctr"/>
+              <a:endParaRPr lang="en-GB"/>
+            </a:p>
+          </p:txBody>
+        </p:sp>
+        <p:cxnSp>
+          <p:nvCxnSpPr>
+            <p:cNvPr id="6" name="Straight Connector 5">
+              <a:extLst>
+                <a:ext uri="{FF2B5EF4-FFF2-40B4-BE49-F238E27FC236}">
+                  <a16:creationId xmlns:a16="http://schemas.microsoft.com/office/drawing/2014/main" id="{9CDEF659-7F22-49FF-9A03-25E3B01F8385}"/>
+                </a:ext>
+              </a:extLst>
+            </p:cNvPr>
+            <p:cNvCxnSpPr>
+              <a:stCxn id="4" idx="1"/>
+              <a:endCxn id="4" idx="5"/>
+            </p:cNvCxnSpPr>
+            <p:nvPr/>
+          </p:nvCxnSpPr>
+          <p:spPr>
+            <a:xfrm>
+              <a:off x="4265469" y="2454628"/>
+              <a:ext cx="1836804" cy="1835298"/>
+            </a:xfrm>
+            <a:prstGeom prst="line">
+              <a:avLst/>
+            </a:prstGeom>
+            <a:ln w="317500">
+              <a:solidFill>
+                <a:srgbClr val="FF0000"/>
+              </a:solidFill>
+            </a:ln>
+          </p:spPr>
+          <p:style>
+            <a:lnRef idx="1">
+              <a:schemeClr val="accent1"/>
+            </a:lnRef>
+            <a:fillRef idx="0">
+              <a:schemeClr val="accent1"/>
+            </a:fillRef>
+            <a:effectRef idx="0">
+              <a:schemeClr val="accent1"/>
+            </a:effectRef>
+            <a:fontRef idx="minor">
+              <a:schemeClr val="tx1"/>
+            </a:fontRef>
+          </p:style>
+        </p:cxnSp>
+      </p:grpSp>
     </p:spTree>
     <p:extLst>
       <p:ext uri="{BB962C8B-B14F-4D97-AF65-F5344CB8AC3E}">

</xml_diff>

<commit_message>
Delete redundant old signs
</commit_message>
<xml_diff>
--- a/signs/signs.pptx
+++ b/signs/signs.pptx
@@ -5,18 +5,19 @@
     <p:sldMasterId id="2147483648" r:id="rId1"/>
   </p:sldMasterIdLst>
   <p:notesMasterIdLst>
-    <p:notesMasterId r:id="rId11"/>
+    <p:notesMasterId r:id="rId12"/>
   </p:notesMasterIdLst>
   <p:sldIdLst>
     <p:sldId id="258" r:id="rId2"/>
-    <p:sldId id="271" r:id="rId3"/>
-    <p:sldId id="262" r:id="rId4"/>
-    <p:sldId id="264" r:id="rId5"/>
-    <p:sldId id="267" r:id="rId6"/>
-    <p:sldId id="270" r:id="rId7"/>
-    <p:sldId id="269" r:id="rId8"/>
-    <p:sldId id="266" r:id="rId9"/>
-    <p:sldId id="265" r:id="rId10"/>
+    <p:sldId id="272" r:id="rId3"/>
+    <p:sldId id="273" r:id="rId4"/>
+    <p:sldId id="271" r:id="rId5"/>
+    <p:sldId id="262" r:id="rId6"/>
+    <p:sldId id="267" r:id="rId7"/>
+    <p:sldId id="270" r:id="rId8"/>
+    <p:sldId id="269" r:id="rId9"/>
+    <p:sldId id="266" r:id="rId10"/>
+    <p:sldId id="265" r:id="rId11"/>
   </p:sldIdLst>
   <p:sldSz cx="10691813" cy="7559675"/>
   <p:notesSz cx="6858000" cy="9144000"/>
@@ -1183,497 +1184,7 @@
 </p:sld>
 </file>
 
-<file path=ppt/slides/slide2.xml><?xml version="1.0" encoding="utf-8"?>
-<p:sld xmlns:a="http://schemas.openxmlformats.org/drawingml/2006/main" xmlns:r="http://schemas.openxmlformats.org/officeDocument/2006/relationships" xmlns:p="http://schemas.openxmlformats.org/presentationml/2006/main">
-  <p:cSld>
-    <p:spTree>
-      <p:nvGrpSpPr>
-        <p:cNvPr id="1" name=""/>
-        <p:cNvGrpSpPr/>
-        <p:nvPr/>
-      </p:nvGrpSpPr>
-      <p:grpSpPr>
-        <a:xfrm>
-          <a:off x="0" y="0"/>
-          <a:ext cx="0" cy="0"/>
-          <a:chOff x="0" y="0"/>
-          <a:chExt cx="0" cy="0"/>
-        </a:xfrm>
-      </p:grpSpPr>
-      <p:pic>
-        <p:nvPicPr>
-          <p:cNvPr id="5" name="Picture Placeholder 4" descr="A picture containing drawing, clock&#10;&#10;Description automatically generated">
-            <a:extLst>
-              <a:ext uri="{FF2B5EF4-FFF2-40B4-BE49-F238E27FC236}">
-                <a16:creationId xmlns:a16="http://schemas.microsoft.com/office/drawing/2014/main" id="{6EE661D4-7341-4250-A68A-0E85D36BB6AE}"/>
-              </a:ext>
-            </a:extLst>
-          </p:cNvPr>
-          <p:cNvPicPr preferRelativeResize="0">
-            <a:picLocks noGrp="1"/>
-          </p:cNvPicPr>
-          <p:nvPr>
-            <p:ph type="pic" sz="quarter" idx="10"/>
-          </p:nvPr>
-        </p:nvPicPr>
-        <p:blipFill>
-          <a:blip r:embed="rId2">
-            <a:extLst>
-              <a:ext uri="{28A0092B-C50C-407E-A947-70E740481C1C}">
-                <a14:useLocalDpi xmlns:a14="http://schemas.microsoft.com/office/drawing/2010/main" val="0"/>
-              </a:ext>
-            </a:extLst>
-          </a:blip>
-          <a:stretch>
-            <a:fillRect/>
-          </a:stretch>
-        </p:blipFill>
-        <p:spPr>
-          <a:xfrm>
-            <a:off x="3977113" y="2264344"/>
-            <a:ext cx="2737586" cy="2621554"/>
-          </a:xfrm>
-        </p:spPr>
-      </p:pic>
-      <p:sp>
-        <p:nvSpPr>
-          <p:cNvPr id="3" name="Text Placeholder 2">
-            <a:extLst>
-              <a:ext uri="{FF2B5EF4-FFF2-40B4-BE49-F238E27FC236}">
-                <a16:creationId xmlns:a16="http://schemas.microsoft.com/office/drawing/2014/main" id="{75D26587-D4E9-496F-A15F-FF56919961EC}"/>
-              </a:ext>
-            </a:extLst>
-          </p:cNvPr>
-          <p:cNvSpPr>
-            <a:spLocks noGrp="1"/>
-          </p:cNvSpPr>
-          <p:nvPr>
-            <p:ph type="body" sz="quarter" idx="11"/>
-          </p:nvPr>
-        </p:nvSpPr>
-        <p:spPr>
-          <a:xfrm>
-            <a:off x="2093726" y="5188851"/>
-            <a:ext cx="6504364" cy="2030816"/>
-          </a:xfrm>
-        </p:spPr>
-        <p:txBody>
-          <a:bodyPr>
-            <a:normAutofit/>
-          </a:bodyPr>
-          <a:lstStyle/>
-          <a:p>
-            <a:r>
-              <a:rPr lang="en-GB" sz="6600" dirty="0"/>
-              <a:t>PHOTOGRAPHY BEYOND THIS POINT</a:t>
-            </a:r>
-          </a:p>
-        </p:txBody>
-      </p:sp>
-    </p:spTree>
-    <p:extLst>
-      <p:ext uri="{BB962C8B-B14F-4D97-AF65-F5344CB8AC3E}">
-        <p14:creationId xmlns:p14="http://schemas.microsoft.com/office/powerpoint/2010/main" val="3549714815"/>
-      </p:ext>
-    </p:extLst>
-  </p:cSld>
-  <p:clrMapOvr>
-    <a:masterClrMapping/>
-  </p:clrMapOvr>
-</p:sld>
-</file>
-
-<file path=ppt/slides/slide3.xml><?xml version="1.0" encoding="utf-8"?>
-<p:sld xmlns:a="http://schemas.openxmlformats.org/drawingml/2006/main" xmlns:r="http://schemas.openxmlformats.org/officeDocument/2006/relationships" xmlns:p="http://schemas.openxmlformats.org/presentationml/2006/main">
-  <p:cSld>
-    <p:spTree>
-      <p:nvGrpSpPr>
-        <p:cNvPr id="1" name=""/>
-        <p:cNvGrpSpPr/>
-        <p:nvPr/>
-      </p:nvGrpSpPr>
-      <p:grpSpPr>
-        <a:xfrm>
-          <a:off x="0" y="0"/>
-          <a:ext cx="0" cy="0"/>
-          <a:chOff x="0" y="0"/>
-          <a:chExt cx="0" cy="0"/>
-        </a:xfrm>
-      </p:grpSpPr>
-      <p:sp>
-        <p:nvSpPr>
-          <p:cNvPr id="2" name="Text Placeholder 1">
-            <a:extLst>
-              <a:ext uri="{FF2B5EF4-FFF2-40B4-BE49-F238E27FC236}">
-                <a16:creationId xmlns:a16="http://schemas.microsoft.com/office/drawing/2014/main" id="{C30B016A-7556-446C-9027-ABABC86835C0}"/>
-              </a:ext>
-            </a:extLst>
-          </p:cNvPr>
-          <p:cNvSpPr>
-            <a:spLocks noGrp="1"/>
-          </p:cNvSpPr>
-          <p:nvPr>
-            <p:ph type="body" sz="quarter" idx="10"/>
-          </p:nvPr>
-        </p:nvSpPr>
-        <p:spPr>
-          <a:xfrm>
-            <a:off x="726281" y="2701997"/>
-            <a:ext cx="9239249" cy="3098302"/>
-          </a:xfrm>
-        </p:spPr>
-        <p:txBody>
-          <a:bodyPr/>
-          <a:lstStyle/>
-          <a:p>
-            <a:r>
-              <a:rPr lang="en-GB" sz="23900" dirty="0"/>
-              <a:t>EXIT</a:t>
-            </a:r>
-            <a:endParaRPr lang="en-GB" dirty="0"/>
-          </a:p>
-        </p:txBody>
-      </p:sp>
-    </p:spTree>
-    <p:extLst>
-      <p:ext uri="{BB962C8B-B14F-4D97-AF65-F5344CB8AC3E}">
-        <p14:creationId xmlns:p14="http://schemas.microsoft.com/office/powerpoint/2010/main" val="3071498411"/>
-      </p:ext>
-    </p:extLst>
-  </p:cSld>
-  <p:clrMapOvr>
-    <a:masterClrMapping/>
-  </p:clrMapOvr>
-</p:sld>
-</file>
-
-<file path=ppt/slides/slide4.xml><?xml version="1.0" encoding="utf-8"?>
-<p:sld xmlns:a="http://schemas.openxmlformats.org/drawingml/2006/main" xmlns:r="http://schemas.openxmlformats.org/officeDocument/2006/relationships" xmlns:p="http://schemas.openxmlformats.org/presentationml/2006/main">
-  <p:cSld>
-    <p:spTree>
-      <p:nvGrpSpPr>
-        <p:cNvPr id="1" name=""/>
-        <p:cNvGrpSpPr/>
-        <p:nvPr/>
-      </p:nvGrpSpPr>
-      <p:grpSpPr>
-        <a:xfrm>
-          <a:off x="0" y="0"/>
-          <a:ext cx="0" cy="0"/>
-          <a:chOff x="0" y="0"/>
-          <a:chExt cx="0" cy="0"/>
-        </a:xfrm>
-      </p:grpSpPr>
-      <p:sp>
-        <p:nvSpPr>
-          <p:cNvPr id="2" name="Text Placeholder 1">
-            <a:extLst>
-              <a:ext uri="{FF2B5EF4-FFF2-40B4-BE49-F238E27FC236}">
-                <a16:creationId xmlns:a16="http://schemas.microsoft.com/office/drawing/2014/main" id="{C30B016A-7556-446C-9027-ABABC86835C0}"/>
-              </a:ext>
-            </a:extLst>
-          </p:cNvPr>
-          <p:cNvSpPr>
-            <a:spLocks noGrp="1"/>
-          </p:cNvSpPr>
-          <p:nvPr>
-            <p:ph type="body" sz="quarter" idx="10"/>
-          </p:nvPr>
-        </p:nvSpPr>
-        <p:spPr>
-          <a:xfrm>
-            <a:off x="726281" y="2701997"/>
-            <a:ext cx="9239249" cy="3098302"/>
-          </a:xfrm>
-        </p:spPr>
-        <p:txBody>
-          <a:bodyPr/>
-          <a:lstStyle/>
-          <a:p>
-            <a:r>
-              <a:rPr lang="en-GB" sz="23900" dirty="0"/>
-              <a:t>ARENA</a:t>
-            </a:r>
-            <a:endParaRPr lang="en-GB" dirty="0"/>
-          </a:p>
-        </p:txBody>
-      </p:sp>
-    </p:spTree>
-    <p:extLst>
-      <p:ext uri="{BB962C8B-B14F-4D97-AF65-F5344CB8AC3E}">
-        <p14:creationId xmlns:p14="http://schemas.microsoft.com/office/powerpoint/2010/main" val="2279350906"/>
-      </p:ext>
-    </p:extLst>
-  </p:cSld>
-  <p:clrMapOvr>
-    <a:masterClrMapping/>
-  </p:clrMapOvr>
-</p:sld>
-</file>
-
-<file path=ppt/slides/slide5.xml><?xml version="1.0" encoding="utf-8"?>
-<p:sld xmlns:a="http://schemas.openxmlformats.org/drawingml/2006/main" xmlns:r="http://schemas.openxmlformats.org/officeDocument/2006/relationships" xmlns:p="http://schemas.openxmlformats.org/presentationml/2006/main">
-  <p:cSld>
-    <p:spTree>
-      <p:nvGrpSpPr>
-        <p:cNvPr id="1" name=""/>
-        <p:cNvGrpSpPr/>
-        <p:nvPr/>
-      </p:nvGrpSpPr>
-      <p:grpSpPr>
-        <a:xfrm>
-          <a:off x="0" y="0"/>
-          <a:ext cx="0" cy="0"/>
-          <a:chOff x="0" y="0"/>
-          <a:chExt cx="0" cy="0"/>
-        </a:xfrm>
-      </p:grpSpPr>
-      <p:sp>
-        <p:nvSpPr>
-          <p:cNvPr id="2" name="Text Placeholder 1">
-            <a:extLst>
-              <a:ext uri="{FF2B5EF4-FFF2-40B4-BE49-F238E27FC236}">
-                <a16:creationId xmlns:a16="http://schemas.microsoft.com/office/drawing/2014/main" id="{C30B016A-7556-446C-9027-ABABC86835C0}"/>
-              </a:ext>
-            </a:extLst>
-          </p:cNvPr>
-          <p:cNvSpPr>
-            <a:spLocks noGrp="1"/>
-          </p:cNvSpPr>
-          <p:nvPr>
-            <p:ph type="body" sz="quarter" idx="10"/>
-          </p:nvPr>
-        </p:nvSpPr>
-        <p:spPr>
-          <a:xfrm>
-            <a:off x="726281" y="3097782"/>
-            <a:ext cx="9239249" cy="3098302"/>
-          </a:xfrm>
-        </p:spPr>
-        <p:txBody>
-          <a:bodyPr/>
-          <a:lstStyle/>
-          <a:p>
-            <a:r>
-              <a:rPr lang="en-GB" sz="13800" dirty="0"/>
-              <a:t>STAGING IN</a:t>
-            </a:r>
-            <a:endParaRPr lang="en-GB" sz="6600" dirty="0"/>
-          </a:p>
-        </p:txBody>
-      </p:sp>
-    </p:spTree>
-    <p:extLst>
-      <p:ext uri="{BB962C8B-B14F-4D97-AF65-F5344CB8AC3E}">
-        <p14:creationId xmlns:p14="http://schemas.microsoft.com/office/powerpoint/2010/main" val="1098096009"/>
-      </p:ext>
-    </p:extLst>
-  </p:cSld>
-  <p:clrMapOvr>
-    <a:masterClrMapping/>
-  </p:clrMapOvr>
-</p:sld>
-</file>
-
-<file path=ppt/slides/slide6.xml><?xml version="1.0" encoding="utf-8"?>
-<p:sld xmlns:a="http://schemas.openxmlformats.org/drawingml/2006/main" xmlns:r="http://schemas.openxmlformats.org/officeDocument/2006/relationships" xmlns:p="http://schemas.openxmlformats.org/presentationml/2006/main">
-  <p:cSld>
-    <p:spTree>
-      <p:nvGrpSpPr>
-        <p:cNvPr id="1" name=""/>
-        <p:cNvGrpSpPr/>
-        <p:nvPr/>
-      </p:nvGrpSpPr>
-      <p:grpSpPr>
-        <a:xfrm>
-          <a:off x="0" y="0"/>
-          <a:ext cx="0" cy="0"/>
-          <a:chOff x="0" y="0"/>
-          <a:chExt cx="0" cy="0"/>
-        </a:xfrm>
-      </p:grpSpPr>
-      <p:sp>
-        <p:nvSpPr>
-          <p:cNvPr id="2" name="Text Placeholder 1">
-            <a:extLst>
-              <a:ext uri="{FF2B5EF4-FFF2-40B4-BE49-F238E27FC236}">
-                <a16:creationId xmlns:a16="http://schemas.microsoft.com/office/drawing/2014/main" id="{C30B016A-7556-446C-9027-ABABC86835C0}"/>
-              </a:ext>
-            </a:extLst>
-          </p:cNvPr>
-          <p:cNvSpPr>
-            <a:spLocks noGrp="1"/>
-          </p:cNvSpPr>
-          <p:nvPr>
-            <p:ph type="body" sz="quarter" idx="10"/>
-          </p:nvPr>
-        </p:nvSpPr>
-        <p:spPr>
-          <a:xfrm>
-            <a:off x="726281" y="3138725"/>
-            <a:ext cx="9239249" cy="3098302"/>
-          </a:xfrm>
-        </p:spPr>
-        <p:txBody>
-          <a:bodyPr/>
-          <a:lstStyle/>
-          <a:p>
-            <a:r>
-              <a:rPr lang="en-GB" sz="13800" dirty="0"/>
-              <a:t>STAGING OUT</a:t>
-            </a:r>
-            <a:endParaRPr lang="en-GB" sz="6600" dirty="0"/>
-          </a:p>
-        </p:txBody>
-      </p:sp>
-    </p:spTree>
-    <p:extLst>
-      <p:ext uri="{BB962C8B-B14F-4D97-AF65-F5344CB8AC3E}">
-        <p14:creationId xmlns:p14="http://schemas.microsoft.com/office/powerpoint/2010/main" val="3202793763"/>
-      </p:ext>
-    </p:extLst>
-  </p:cSld>
-  <p:clrMapOvr>
-    <a:masterClrMapping/>
-  </p:clrMapOvr>
-</p:sld>
-</file>
-
-<file path=ppt/slides/slide7.xml><?xml version="1.0" encoding="utf-8"?>
-<p:sld xmlns:a="http://schemas.openxmlformats.org/drawingml/2006/main" xmlns:r="http://schemas.openxmlformats.org/officeDocument/2006/relationships" xmlns:p="http://schemas.openxmlformats.org/presentationml/2006/main">
-  <p:cSld>
-    <p:spTree>
-      <p:nvGrpSpPr>
-        <p:cNvPr id="1" name=""/>
-        <p:cNvGrpSpPr/>
-        <p:nvPr/>
-      </p:nvGrpSpPr>
-      <p:grpSpPr>
-        <a:xfrm>
-          <a:off x="0" y="0"/>
-          <a:ext cx="0" cy="0"/>
-          <a:chOff x="0" y="0"/>
-          <a:chExt cx="0" cy="0"/>
-        </a:xfrm>
-      </p:grpSpPr>
-      <p:sp>
-        <p:nvSpPr>
-          <p:cNvPr id="2" name="Text Placeholder 1">
-            <a:extLst>
-              <a:ext uri="{FF2B5EF4-FFF2-40B4-BE49-F238E27FC236}">
-                <a16:creationId xmlns:a16="http://schemas.microsoft.com/office/drawing/2014/main" id="{C30B016A-7556-446C-9027-ABABC86835C0}"/>
-              </a:ext>
-            </a:extLst>
-          </p:cNvPr>
-          <p:cNvSpPr>
-            <a:spLocks noGrp="1"/>
-          </p:cNvSpPr>
-          <p:nvPr>
-            <p:ph type="body" sz="quarter" idx="10"/>
-          </p:nvPr>
-        </p:nvSpPr>
-        <p:spPr>
-          <a:xfrm>
-            <a:off x="726281" y="3029544"/>
-            <a:ext cx="9239249" cy="3098302"/>
-          </a:xfrm>
-        </p:spPr>
-        <p:txBody>
-          <a:bodyPr/>
-          <a:lstStyle/>
-          <a:p>
-            <a:r>
-              <a:rPr lang="en-GB" sz="16600" dirty="0"/>
-              <a:t>QUIET ZONE</a:t>
-            </a:r>
-            <a:endParaRPr lang="en-GB" sz="7200" dirty="0"/>
-          </a:p>
-        </p:txBody>
-      </p:sp>
-    </p:spTree>
-    <p:extLst>
-      <p:ext uri="{BB962C8B-B14F-4D97-AF65-F5344CB8AC3E}">
-        <p14:creationId xmlns:p14="http://schemas.microsoft.com/office/powerpoint/2010/main" val="18492442"/>
-      </p:ext>
-    </p:extLst>
-  </p:cSld>
-  <p:clrMapOvr>
-    <a:masterClrMapping/>
-  </p:clrMapOvr>
-</p:sld>
-</file>
-
-<file path=ppt/slides/slide8.xml><?xml version="1.0" encoding="utf-8"?>
-<p:sld xmlns:a="http://schemas.openxmlformats.org/drawingml/2006/main" xmlns:r="http://schemas.openxmlformats.org/officeDocument/2006/relationships" xmlns:p="http://schemas.openxmlformats.org/presentationml/2006/main">
-  <p:cSld>
-    <p:spTree>
-      <p:nvGrpSpPr>
-        <p:cNvPr id="1" name=""/>
-        <p:cNvGrpSpPr/>
-        <p:nvPr/>
-      </p:nvGrpSpPr>
-      <p:grpSpPr>
-        <a:xfrm>
-          <a:off x="0" y="0"/>
-          <a:ext cx="0" cy="0"/>
-          <a:chOff x="0" y="0"/>
-          <a:chExt cx="0" cy="0"/>
-        </a:xfrm>
-      </p:grpSpPr>
-      <p:sp>
-        <p:nvSpPr>
-          <p:cNvPr id="2" name="Text Placeholder 1">
-            <a:extLst>
-              <a:ext uri="{FF2B5EF4-FFF2-40B4-BE49-F238E27FC236}">
-                <a16:creationId xmlns:a16="http://schemas.microsoft.com/office/drawing/2014/main" id="{C30B016A-7556-446C-9027-ABABC86835C0}"/>
-              </a:ext>
-            </a:extLst>
-          </p:cNvPr>
-          <p:cNvSpPr>
-            <a:spLocks noGrp="1"/>
-          </p:cNvSpPr>
-          <p:nvPr>
-            <p:ph type="body" sz="quarter" idx="10"/>
-          </p:nvPr>
-        </p:nvSpPr>
-        <p:spPr>
-          <a:xfrm>
-            <a:off x="726281" y="2647405"/>
-            <a:ext cx="9239249" cy="3794337"/>
-          </a:xfrm>
-        </p:spPr>
-        <p:txBody>
-          <a:bodyPr/>
-          <a:lstStyle/>
-          <a:p>
-            <a:r>
-              <a:rPr lang="en-GB" sz="11500" dirty="0"/>
-              <a:t>POWER TOOLS</a:t>
-            </a:r>
-          </a:p>
-          <a:p>
-            <a:r>
-              <a:rPr lang="en-GB" sz="11500" dirty="0"/>
-              <a:t>AREA</a:t>
-            </a:r>
-            <a:endParaRPr lang="en-GB" sz="6000" dirty="0"/>
-          </a:p>
-        </p:txBody>
-      </p:sp>
-    </p:spTree>
-    <p:extLst>
-      <p:ext uri="{BB962C8B-B14F-4D97-AF65-F5344CB8AC3E}">
-        <p14:creationId xmlns:p14="http://schemas.microsoft.com/office/powerpoint/2010/main" val="3020136911"/>
-      </p:ext>
-    </p:extLst>
-  </p:cSld>
-  <p:clrMapOvr>
-    <a:masterClrMapping/>
-  </p:clrMapOvr>
-</p:sld>
-</file>
-
-<file path=ppt/slides/slide9.xml><?xml version="1.0" encoding="utf-8"?>
+<file path=ppt/slides/slide10.xml><?xml version="1.0" encoding="utf-8"?>
 <p:sld xmlns:a="http://schemas.openxmlformats.org/drawingml/2006/main" xmlns:r="http://schemas.openxmlformats.org/officeDocument/2006/relationships" xmlns:p="http://schemas.openxmlformats.org/presentationml/2006/main">
   <p:cSld>
     <p:spTree>
@@ -1847,6 +1358,562 @@
     <p:extLst>
       <p:ext uri="{BB962C8B-B14F-4D97-AF65-F5344CB8AC3E}">
         <p14:creationId xmlns:p14="http://schemas.microsoft.com/office/powerpoint/2010/main" val="411968747"/>
+      </p:ext>
+    </p:extLst>
+  </p:cSld>
+  <p:clrMapOvr>
+    <a:masterClrMapping/>
+  </p:clrMapOvr>
+</p:sld>
+</file>
+
+<file path=ppt/slides/slide2.xml><?xml version="1.0" encoding="utf-8"?>
+<p:sld xmlns:a="http://schemas.openxmlformats.org/drawingml/2006/main" xmlns:r="http://schemas.openxmlformats.org/officeDocument/2006/relationships" xmlns:p="http://schemas.openxmlformats.org/presentationml/2006/main">
+  <p:cSld>
+    <p:spTree>
+      <p:nvGrpSpPr>
+        <p:cNvPr id="1" name=""/>
+        <p:cNvGrpSpPr/>
+        <p:nvPr/>
+      </p:nvGrpSpPr>
+      <p:grpSpPr>
+        <a:xfrm>
+          <a:off x="0" y="0"/>
+          <a:ext cx="0" cy="0"/>
+          <a:chOff x="0" y="0"/>
+          <a:chExt cx="0" cy="0"/>
+        </a:xfrm>
+      </p:grpSpPr>
+      <p:sp>
+        <p:nvSpPr>
+          <p:cNvPr id="3" name="Text Placeholder 2">
+            <a:extLst>
+              <a:ext uri="{FF2B5EF4-FFF2-40B4-BE49-F238E27FC236}">
+                <a16:creationId xmlns:a16="http://schemas.microsoft.com/office/drawing/2014/main" id="{AE5C0D51-0BCE-42E9-B506-E2501DF53E8F}"/>
+              </a:ext>
+            </a:extLst>
+          </p:cNvPr>
+          <p:cNvSpPr>
+            <a:spLocks noGrp="1"/>
+          </p:cNvSpPr>
+          <p:nvPr>
+            <p:ph type="body" sz="quarter" idx="11"/>
+          </p:nvPr>
+        </p:nvSpPr>
+        <p:spPr>
+          <a:xfrm>
+            <a:off x="1099077" y="2758001"/>
+            <a:ext cx="8493660" cy="2043674"/>
+          </a:xfrm>
+        </p:spPr>
+        <p:txBody>
+          <a:bodyPr>
+            <a:normAutofit lnSpcReduction="10000"/>
+          </a:bodyPr>
+          <a:lstStyle/>
+          <a:p>
+            <a:r>
+              <a:rPr lang="en-GB" sz="14501" dirty="0"/>
+              <a:t>ARENA</a:t>
+            </a:r>
+          </a:p>
+        </p:txBody>
+      </p:sp>
+    </p:spTree>
+    <p:extLst>
+      <p:ext uri="{BB962C8B-B14F-4D97-AF65-F5344CB8AC3E}">
+        <p14:creationId xmlns:p14="http://schemas.microsoft.com/office/powerpoint/2010/main" val="3531657988"/>
+      </p:ext>
+    </p:extLst>
+  </p:cSld>
+  <p:clrMapOvr>
+    <a:masterClrMapping/>
+  </p:clrMapOvr>
+</p:sld>
+</file>
+
+<file path=ppt/slides/slide3.xml><?xml version="1.0" encoding="utf-8"?>
+<p:sld xmlns:a="http://schemas.openxmlformats.org/drawingml/2006/main" xmlns:r="http://schemas.openxmlformats.org/officeDocument/2006/relationships" xmlns:p="http://schemas.openxmlformats.org/presentationml/2006/main">
+  <p:cSld>
+    <p:spTree>
+      <p:nvGrpSpPr>
+        <p:cNvPr id="1" name=""/>
+        <p:cNvGrpSpPr/>
+        <p:nvPr/>
+      </p:nvGrpSpPr>
+      <p:grpSpPr>
+        <a:xfrm>
+          <a:off x="0" y="0"/>
+          <a:ext cx="0" cy="0"/>
+          <a:chOff x="0" y="0"/>
+          <a:chExt cx="0" cy="0"/>
+        </a:xfrm>
+      </p:grpSpPr>
+      <p:sp>
+        <p:nvSpPr>
+          <p:cNvPr id="3" name="Text Placeholder 2">
+            <a:extLst>
+              <a:ext uri="{FF2B5EF4-FFF2-40B4-BE49-F238E27FC236}">
+                <a16:creationId xmlns:a16="http://schemas.microsoft.com/office/drawing/2014/main" id="{AE5C0D51-0BCE-42E9-B506-E2501DF53E8F}"/>
+              </a:ext>
+            </a:extLst>
+          </p:cNvPr>
+          <p:cNvSpPr>
+            <a:spLocks noGrp="1"/>
+          </p:cNvSpPr>
+          <p:nvPr>
+            <p:ph type="body" sz="quarter" idx="11"/>
+          </p:nvPr>
+        </p:nvSpPr>
+        <p:spPr>
+          <a:xfrm>
+            <a:off x="1099077" y="2758001"/>
+            <a:ext cx="8493660" cy="2043674"/>
+          </a:xfrm>
+        </p:spPr>
+        <p:txBody>
+          <a:bodyPr>
+            <a:normAutofit lnSpcReduction="10000"/>
+          </a:bodyPr>
+          <a:lstStyle/>
+          <a:p>
+            <a:r>
+              <a:rPr lang="en-GB" sz="14501" dirty="0"/>
+              <a:t>HELPDESK</a:t>
+            </a:r>
+          </a:p>
+        </p:txBody>
+      </p:sp>
+    </p:spTree>
+    <p:extLst>
+      <p:ext uri="{BB962C8B-B14F-4D97-AF65-F5344CB8AC3E}">
+        <p14:creationId xmlns:p14="http://schemas.microsoft.com/office/powerpoint/2010/main" val="2217668991"/>
+      </p:ext>
+    </p:extLst>
+  </p:cSld>
+  <p:clrMapOvr>
+    <a:masterClrMapping/>
+  </p:clrMapOvr>
+</p:sld>
+</file>
+
+<file path=ppt/slides/slide4.xml><?xml version="1.0" encoding="utf-8"?>
+<p:sld xmlns:a="http://schemas.openxmlformats.org/drawingml/2006/main" xmlns:r="http://schemas.openxmlformats.org/officeDocument/2006/relationships" xmlns:p="http://schemas.openxmlformats.org/presentationml/2006/main">
+  <p:cSld>
+    <p:spTree>
+      <p:nvGrpSpPr>
+        <p:cNvPr id="1" name=""/>
+        <p:cNvGrpSpPr/>
+        <p:nvPr/>
+      </p:nvGrpSpPr>
+      <p:grpSpPr>
+        <a:xfrm>
+          <a:off x="0" y="0"/>
+          <a:ext cx="0" cy="0"/>
+          <a:chOff x="0" y="0"/>
+          <a:chExt cx="0" cy="0"/>
+        </a:xfrm>
+      </p:grpSpPr>
+      <p:pic>
+        <p:nvPicPr>
+          <p:cNvPr id="5" name="Picture Placeholder 4" descr="A picture containing drawing, clock&#10;&#10;Description automatically generated">
+            <a:extLst>
+              <a:ext uri="{FF2B5EF4-FFF2-40B4-BE49-F238E27FC236}">
+                <a16:creationId xmlns:a16="http://schemas.microsoft.com/office/drawing/2014/main" id="{6EE661D4-7341-4250-A68A-0E85D36BB6AE}"/>
+              </a:ext>
+            </a:extLst>
+          </p:cNvPr>
+          <p:cNvPicPr preferRelativeResize="0">
+            <a:picLocks noGrp="1"/>
+          </p:cNvPicPr>
+          <p:nvPr>
+            <p:ph type="pic" sz="quarter" idx="10"/>
+          </p:nvPr>
+        </p:nvPicPr>
+        <p:blipFill>
+          <a:blip r:embed="rId2">
+            <a:extLst>
+              <a:ext uri="{28A0092B-C50C-407E-A947-70E740481C1C}">
+                <a14:useLocalDpi xmlns:a14="http://schemas.microsoft.com/office/drawing/2010/main" val="0"/>
+              </a:ext>
+            </a:extLst>
+          </a:blip>
+          <a:stretch>
+            <a:fillRect/>
+          </a:stretch>
+        </p:blipFill>
+        <p:spPr>
+          <a:xfrm>
+            <a:off x="3977113" y="2264344"/>
+            <a:ext cx="2737586" cy="2621554"/>
+          </a:xfrm>
+        </p:spPr>
+      </p:pic>
+      <p:sp>
+        <p:nvSpPr>
+          <p:cNvPr id="3" name="Text Placeholder 2">
+            <a:extLst>
+              <a:ext uri="{FF2B5EF4-FFF2-40B4-BE49-F238E27FC236}">
+                <a16:creationId xmlns:a16="http://schemas.microsoft.com/office/drawing/2014/main" id="{75D26587-D4E9-496F-A15F-FF56919961EC}"/>
+              </a:ext>
+            </a:extLst>
+          </p:cNvPr>
+          <p:cNvSpPr>
+            <a:spLocks noGrp="1"/>
+          </p:cNvSpPr>
+          <p:nvPr>
+            <p:ph type="body" sz="quarter" idx="11"/>
+          </p:nvPr>
+        </p:nvSpPr>
+        <p:spPr>
+          <a:xfrm>
+            <a:off x="2093726" y="5188851"/>
+            <a:ext cx="6504364" cy="2030816"/>
+          </a:xfrm>
+        </p:spPr>
+        <p:txBody>
+          <a:bodyPr>
+            <a:normAutofit/>
+          </a:bodyPr>
+          <a:lstStyle/>
+          <a:p>
+            <a:r>
+              <a:rPr lang="en-GB" sz="6600" dirty="0"/>
+              <a:t>PHOTOGRAPHY BEYOND THIS POINT</a:t>
+            </a:r>
+          </a:p>
+        </p:txBody>
+      </p:sp>
+    </p:spTree>
+    <p:extLst>
+      <p:ext uri="{BB962C8B-B14F-4D97-AF65-F5344CB8AC3E}">
+        <p14:creationId xmlns:p14="http://schemas.microsoft.com/office/powerpoint/2010/main" val="3549714815"/>
+      </p:ext>
+    </p:extLst>
+  </p:cSld>
+  <p:clrMapOvr>
+    <a:masterClrMapping/>
+  </p:clrMapOvr>
+</p:sld>
+</file>
+
+<file path=ppt/slides/slide5.xml><?xml version="1.0" encoding="utf-8"?>
+<p:sld xmlns:a="http://schemas.openxmlformats.org/drawingml/2006/main" xmlns:r="http://schemas.openxmlformats.org/officeDocument/2006/relationships" xmlns:p="http://schemas.openxmlformats.org/presentationml/2006/main">
+  <p:cSld>
+    <p:spTree>
+      <p:nvGrpSpPr>
+        <p:cNvPr id="1" name=""/>
+        <p:cNvGrpSpPr/>
+        <p:nvPr/>
+      </p:nvGrpSpPr>
+      <p:grpSpPr>
+        <a:xfrm>
+          <a:off x="0" y="0"/>
+          <a:ext cx="0" cy="0"/>
+          <a:chOff x="0" y="0"/>
+          <a:chExt cx="0" cy="0"/>
+        </a:xfrm>
+      </p:grpSpPr>
+      <p:sp>
+        <p:nvSpPr>
+          <p:cNvPr id="2" name="Text Placeholder 1">
+            <a:extLst>
+              <a:ext uri="{FF2B5EF4-FFF2-40B4-BE49-F238E27FC236}">
+                <a16:creationId xmlns:a16="http://schemas.microsoft.com/office/drawing/2014/main" id="{C30B016A-7556-446C-9027-ABABC86835C0}"/>
+              </a:ext>
+            </a:extLst>
+          </p:cNvPr>
+          <p:cNvSpPr>
+            <a:spLocks noGrp="1"/>
+          </p:cNvSpPr>
+          <p:nvPr>
+            <p:ph type="body" sz="quarter" idx="10"/>
+          </p:nvPr>
+        </p:nvSpPr>
+        <p:spPr>
+          <a:xfrm>
+            <a:off x="726281" y="2701997"/>
+            <a:ext cx="9239249" cy="3098302"/>
+          </a:xfrm>
+        </p:spPr>
+        <p:txBody>
+          <a:bodyPr/>
+          <a:lstStyle/>
+          <a:p>
+            <a:r>
+              <a:rPr lang="en-GB" sz="23900" dirty="0"/>
+              <a:t>EXIT</a:t>
+            </a:r>
+            <a:endParaRPr lang="en-GB" dirty="0"/>
+          </a:p>
+        </p:txBody>
+      </p:sp>
+    </p:spTree>
+    <p:extLst>
+      <p:ext uri="{BB962C8B-B14F-4D97-AF65-F5344CB8AC3E}">
+        <p14:creationId xmlns:p14="http://schemas.microsoft.com/office/powerpoint/2010/main" val="3071498411"/>
+      </p:ext>
+    </p:extLst>
+  </p:cSld>
+  <p:clrMapOvr>
+    <a:masterClrMapping/>
+  </p:clrMapOvr>
+</p:sld>
+</file>
+
+<file path=ppt/slides/slide6.xml><?xml version="1.0" encoding="utf-8"?>
+<p:sld xmlns:a="http://schemas.openxmlformats.org/drawingml/2006/main" xmlns:r="http://schemas.openxmlformats.org/officeDocument/2006/relationships" xmlns:p="http://schemas.openxmlformats.org/presentationml/2006/main">
+  <p:cSld>
+    <p:spTree>
+      <p:nvGrpSpPr>
+        <p:cNvPr id="1" name=""/>
+        <p:cNvGrpSpPr/>
+        <p:nvPr/>
+      </p:nvGrpSpPr>
+      <p:grpSpPr>
+        <a:xfrm>
+          <a:off x="0" y="0"/>
+          <a:ext cx="0" cy="0"/>
+          <a:chOff x="0" y="0"/>
+          <a:chExt cx="0" cy="0"/>
+        </a:xfrm>
+      </p:grpSpPr>
+      <p:sp>
+        <p:nvSpPr>
+          <p:cNvPr id="2" name="Text Placeholder 1">
+            <a:extLst>
+              <a:ext uri="{FF2B5EF4-FFF2-40B4-BE49-F238E27FC236}">
+                <a16:creationId xmlns:a16="http://schemas.microsoft.com/office/drawing/2014/main" id="{C30B016A-7556-446C-9027-ABABC86835C0}"/>
+              </a:ext>
+            </a:extLst>
+          </p:cNvPr>
+          <p:cNvSpPr>
+            <a:spLocks noGrp="1"/>
+          </p:cNvSpPr>
+          <p:nvPr>
+            <p:ph type="body" sz="quarter" idx="10"/>
+          </p:nvPr>
+        </p:nvSpPr>
+        <p:spPr>
+          <a:xfrm>
+            <a:off x="726281" y="3097782"/>
+            <a:ext cx="9239249" cy="3098302"/>
+          </a:xfrm>
+        </p:spPr>
+        <p:txBody>
+          <a:bodyPr/>
+          <a:lstStyle/>
+          <a:p>
+            <a:r>
+              <a:rPr lang="en-GB" sz="13800" dirty="0"/>
+              <a:t>STAGING IN</a:t>
+            </a:r>
+            <a:endParaRPr lang="en-GB" sz="6600" dirty="0"/>
+          </a:p>
+        </p:txBody>
+      </p:sp>
+    </p:spTree>
+    <p:extLst>
+      <p:ext uri="{BB962C8B-B14F-4D97-AF65-F5344CB8AC3E}">
+        <p14:creationId xmlns:p14="http://schemas.microsoft.com/office/powerpoint/2010/main" val="1098096009"/>
+      </p:ext>
+    </p:extLst>
+  </p:cSld>
+  <p:clrMapOvr>
+    <a:masterClrMapping/>
+  </p:clrMapOvr>
+</p:sld>
+</file>
+
+<file path=ppt/slides/slide7.xml><?xml version="1.0" encoding="utf-8"?>
+<p:sld xmlns:a="http://schemas.openxmlformats.org/drawingml/2006/main" xmlns:r="http://schemas.openxmlformats.org/officeDocument/2006/relationships" xmlns:p="http://schemas.openxmlformats.org/presentationml/2006/main">
+  <p:cSld>
+    <p:spTree>
+      <p:nvGrpSpPr>
+        <p:cNvPr id="1" name=""/>
+        <p:cNvGrpSpPr/>
+        <p:nvPr/>
+      </p:nvGrpSpPr>
+      <p:grpSpPr>
+        <a:xfrm>
+          <a:off x="0" y="0"/>
+          <a:ext cx="0" cy="0"/>
+          <a:chOff x="0" y="0"/>
+          <a:chExt cx="0" cy="0"/>
+        </a:xfrm>
+      </p:grpSpPr>
+      <p:sp>
+        <p:nvSpPr>
+          <p:cNvPr id="2" name="Text Placeholder 1">
+            <a:extLst>
+              <a:ext uri="{FF2B5EF4-FFF2-40B4-BE49-F238E27FC236}">
+                <a16:creationId xmlns:a16="http://schemas.microsoft.com/office/drawing/2014/main" id="{C30B016A-7556-446C-9027-ABABC86835C0}"/>
+              </a:ext>
+            </a:extLst>
+          </p:cNvPr>
+          <p:cNvSpPr>
+            <a:spLocks noGrp="1"/>
+          </p:cNvSpPr>
+          <p:nvPr>
+            <p:ph type="body" sz="quarter" idx="10"/>
+          </p:nvPr>
+        </p:nvSpPr>
+        <p:spPr>
+          <a:xfrm>
+            <a:off x="726281" y="3138725"/>
+            <a:ext cx="9239249" cy="3098302"/>
+          </a:xfrm>
+        </p:spPr>
+        <p:txBody>
+          <a:bodyPr/>
+          <a:lstStyle/>
+          <a:p>
+            <a:r>
+              <a:rPr lang="en-GB" sz="13800" dirty="0"/>
+              <a:t>STAGING OUT</a:t>
+            </a:r>
+            <a:endParaRPr lang="en-GB" sz="6600" dirty="0"/>
+          </a:p>
+        </p:txBody>
+      </p:sp>
+    </p:spTree>
+    <p:extLst>
+      <p:ext uri="{BB962C8B-B14F-4D97-AF65-F5344CB8AC3E}">
+        <p14:creationId xmlns:p14="http://schemas.microsoft.com/office/powerpoint/2010/main" val="3202793763"/>
+      </p:ext>
+    </p:extLst>
+  </p:cSld>
+  <p:clrMapOvr>
+    <a:masterClrMapping/>
+  </p:clrMapOvr>
+</p:sld>
+</file>
+
+<file path=ppt/slides/slide8.xml><?xml version="1.0" encoding="utf-8"?>
+<p:sld xmlns:a="http://schemas.openxmlformats.org/drawingml/2006/main" xmlns:r="http://schemas.openxmlformats.org/officeDocument/2006/relationships" xmlns:p="http://schemas.openxmlformats.org/presentationml/2006/main">
+  <p:cSld>
+    <p:spTree>
+      <p:nvGrpSpPr>
+        <p:cNvPr id="1" name=""/>
+        <p:cNvGrpSpPr/>
+        <p:nvPr/>
+      </p:nvGrpSpPr>
+      <p:grpSpPr>
+        <a:xfrm>
+          <a:off x="0" y="0"/>
+          <a:ext cx="0" cy="0"/>
+          <a:chOff x="0" y="0"/>
+          <a:chExt cx="0" cy="0"/>
+        </a:xfrm>
+      </p:grpSpPr>
+      <p:sp>
+        <p:nvSpPr>
+          <p:cNvPr id="2" name="Text Placeholder 1">
+            <a:extLst>
+              <a:ext uri="{FF2B5EF4-FFF2-40B4-BE49-F238E27FC236}">
+                <a16:creationId xmlns:a16="http://schemas.microsoft.com/office/drawing/2014/main" id="{C30B016A-7556-446C-9027-ABABC86835C0}"/>
+              </a:ext>
+            </a:extLst>
+          </p:cNvPr>
+          <p:cNvSpPr>
+            <a:spLocks noGrp="1"/>
+          </p:cNvSpPr>
+          <p:nvPr>
+            <p:ph type="body" sz="quarter" idx="10"/>
+          </p:nvPr>
+        </p:nvSpPr>
+        <p:spPr>
+          <a:xfrm>
+            <a:off x="726281" y="3029544"/>
+            <a:ext cx="9239249" cy="3098302"/>
+          </a:xfrm>
+        </p:spPr>
+        <p:txBody>
+          <a:bodyPr/>
+          <a:lstStyle/>
+          <a:p>
+            <a:r>
+              <a:rPr lang="en-GB" sz="16600" dirty="0"/>
+              <a:t>QUIET ZONE</a:t>
+            </a:r>
+            <a:endParaRPr lang="en-GB" sz="7200" dirty="0"/>
+          </a:p>
+        </p:txBody>
+      </p:sp>
+    </p:spTree>
+    <p:extLst>
+      <p:ext uri="{BB962C8B-B14F-4D97-AF65-F5344CB8AC3E}">
+        <p14:creationId xmlns:p14="http://schemas.microsoft.com/office/powerpoint/2010/main" val="18492442"/>
+      </p:ext>
+    </p:extLst>
+  </p:cSld>
+  <p:clrMapOvr>
+    <a:masterClrMapping/>
+  </p:clrMapOvr>
+</p:sld>
+</file>
+
+<file path=ppt/slides/slide9.xml><?xml version="1.0" encoding="utf-8"?>
+<p:sld xmlns:a="http://schemas.openxmlformats.org/drawingml/2006/main" xmlns:r="http://schemas.openxmlformats.org/officeDocument/2006/relationships" xmlns:p="http://schemas.openxmlformats.org/presentationml/2006/main">
+  <p:cSld>
+    <p:spTree>
+      <p:nvGrpSpPr>
+        <p:cNvPr id="1" name=""/>
+        <p:cNvGrpSpPr/>
+        <p:nvPr/>
+      </p:nvGrpSpPr>
+      <p:grpSpPr>
+        <a:xfrm>
+          <a:off x="0" y="0"/>
+          <a:ext cx="0" cy="0"/>
+          <a:chOff x="0" y="0"/>
+          <a:chExt cx="0" cy="0"/>
+        </a:xfrm>
+      </p:grpSpPr>
+      <p:sp>
+        <p:nvSpPr>
+          <p:cNvPr id="2" name="Text Placeholder 1">
+            <a:extLst>
+              <a:ext uri="{FF2B5EF4-FFF2-40B4-BE49-F238E27FC236}">
+                <a16:creationId xmlns:a16="http://schemas.microsoft.com/office/drawing/2014/main" id="{C30B016A-7556-446C-9027-ABABC86835C0}"/>
+              </a:ext>
+            </a:extLst>
+          </p:cNvPr>
+          <p:cNvSpPr>
+            <a:spLocks noGrp="1"/>
+          </p:cNvSpPr>
+          <p:nvPr>
+            <p:ph type="body" sz="quarter" idx="10"/>
+          </p:nvPr>
+        </p:nvSpPr>
+        <p:spPr>
+          <a:xfrm>
+            <a:off x="726281" y="2647405"/>
+            <a:ext cx="9239249" cy="3794337"/>
+          </a:xfrm>
+        </p:spPr>
+        <p:txBody>
+          <a:bodyPr/>
+          <a:lstStyle/>
+          <a:p>
+            <a:r>
+              <a:rPr lang="en-GB" sz="11500" dirty="0"/>
+              <a:t>POWER TOOLS</a:t>
+            </a:r>
+          </a:p>
+          <a:p>
+            <a:r>
+              <a:rPr lang="en-GB" sz="11500" dirty="0"/>
+              <a:t>AREA</a:t>
+            </a:r>
+            <a:endParaRPr lang="en-GB" sz="6000" dirty="0"/>
+          </a:p>
+        </p:txBody>
+      </p:sp>
+    </p:spTree>
+    <p:extLst>
+      <p:ext uri="{BB962C8B-B14F-4D97-AF65-F5344CB8AC3E}">
+        <p14:creationId xmlns:p14="http://schemas.microsoft.com/office/powerpoint/2010/main" val="3020136911"/>
       </p:ext>
     </p:extLst>
   </p:cSld>

</xml_diff>

<commit_message>
No robots beyond this point
</commit_message>
<xml_diff>
--- a/signs/signs.pptx
+++ b/signs/signs.pptx
@@ -5,19 +5,20 @@
     <p:sldMasterId id="2147483648" r:id="rId1"/>
   </p:sldMasterIdLst>
   <p:notesMasterIdLst>
-    <p:notesMasterId r:id="rId12"/>
+    <p:notesMasterId r:id="rId13"/>
   </p:notesMasterIdLst>
   <p:sldIdLst>
     <p:sldId id="258" r:id="rId2"/>
-    <p:sldId id="272" r:id="rId3"/>
-    <p:sldId id="273" r:id="rId4"/>
-    <p:sldId id="271" r:id="rId5"/>
-    <p:sldId id="262" r:id="rId6"/>
-    <p:sldId id="267" r:id="rId7"/>
-    <p:sldId id="270" r:id="rId8"/>
-    <p:sldId id="269" r:id="rId9"/>
-    <p:sldId id="266" r:id="rId10"/>
-    <p:sldId id="265" r:id="rId11"/>
+    <p:sldId id="274" r:id="rId3"/>
+    <p:sldId id="272" r:id="rId4"/>
+    <p:sldId id="273" r:id="rId5"/>
+    <p:sldId id="271" r:id="rId6"/>
+    <p:sldId id="262" r:id="rId7"/>
+    <p:sldId id="267" r:id="rId8"/>
+    <p:sldId id="270" r:id="rId9"/>
+    <p:sldId id="269" r:id="rId10"/>
+    <p:sldId id="266" r:id="rId11"/>
+    <p:sldId id="265" r:id="rId12"/>
   </p:sldIdLst>
   <p:sldSz cx="10691813" cy="7559675"/>
   <p:notesSz cx="6858000" cy="9144000"/>
@@ -1214,6 +1215,76 @@
             <a:spLocks noGrp="1"/>
           </p:cNvSpPr>
           <p:nvPr>
+            <p:ph type="body" sz="quarter" idx="10"/>
+          </p:nvPr>
+        </p:nvSpPr>
+        <p:spPr>
+          <a:xfrm>
+            <a:off x="726281" y="2647405"/>
+            <a:ext cx="9239249" cy="3794337"/>
+          </a:xfrm>
+        </p:spPr>
+        <p:txBody>
+          <a:bodyPr/>
+          <a:lstStyle/>
+          <a:p>
+            <a:r>
+              <a:rPr lang="en-GB" sz="11500" dirty="0"/>
+              <a:t>POWER TOOLS</a:t>
+            </a:r>
+          </a:p>
+          <a:p>
+            <a:r>
+              <a:rPr lang="en-GB" sz="11500" dirty="0"/>
+              <a:t>AREA</a:t>
+            </a:r>
+            <a:endParaRPr lang="en-GB" sz="6000" dirty="0"/>
+          </a:p>
+        </p:txBody>
+      </p:sp>
+    </p:spTree>
+    <p:extLst>
+      <p:ext uri="{BB962C8B-B14F-4D97-AF65-F5344CB8AC3E}">
+        <p14:creationId xmlns:p14="http://schemas.microsoft.com/office/powerpoint/2010/main" val="3020136911"/>
+      </p:ext>
+    </p:extLst>
+  </p:cSld>
+  <p:clrMapOvr>
+    <a:masterClrMapping/>
+  </p:clrMapOvr>
+</p:sld>
+</file>
+
+<file path=ppt/slides/slide11.xml><?xml version="1.0" encoding="utf-8"?>
+<p:sld xmlns:a="http://schemas.openxmlformats.org/drawingml/2006/main" xmlns:r="http://schemas.openxmlformats.org/officeDocument/2006/relationships" xmlns:p="http://schemas.openxmlformats.org/presentationml/2006/main">
+  <p:cSld>
+    <p:spTree>
+      <p:nvGrpSpPr>
+        <p:cNvPr id="1" name=""/>
+        <p:cNvGrpSpPr/>
+        <p:nvPr/>
+      </p:nvGrpSpPr>
+      <p:grpSpPr>
+        <a:xfrm>
+          <a:off x="0" y="0"/>
+          <a:ext cx="0" cy="0"/>
+          <a:chOff x="0" y="0"/>
+          <a:chExt cx="0" cy="0"/>
+        </a:xfrm>
+      </p:grpSpPr>
+      <p:sp>
+        <p:nvSpPr>
+          <p:cNvPr id="2" name="Text Placeholder 1">
+            <a:extLst>
+              <a:ext uri="{FF2B5EF4-FFF2-40B4-BE49-F238E27FC236}">
+                <a16:creationId xmlns:a16="http://schemas.microsoft.com/office/drawing/2014/main" id="{C30B016A-7556-446C-9027-ABABC86835C0}"/>
+              </a:ext>
+            </a:extLst>
+          </p:cNvPr>
+          <p:cNvSpPr>
+            <a:spLocks noGrp="1"/>
+          </p:cNvSpPr>
+          <p:nvPr>
             <p:ph type="body" sz="quarter" idx="11"/>
           </p:nvPr>
         </p:nvSpPr>
@@ -1386,10 +1457,10 @@
       </p:grpSpPr>
       <p:sp>
         <p:nvSpPr>
-          <p:cNvPr id="3" name="Text Placeholder 2">
+          <p:cNvPr id="2" name="Text Placeholder 1">
             <a:extLst>
               <a:ext uri="{FF2B5EF4-FFF2-40B4-BE49-F238E27FC236}">
-                <a16:creationId xmlns:a16="http://schemas.microsoft.com/office/drawing/2014/main" id="{AE5C0D51-0BCE-42E9-B506-E2501DF53E8F}"/>
+                <a16:creationId xmlns:a16="http://schemas.microsoft.com/office/drawing/2014/main" id="{65DC55DE-6A7B-4FB6-918C-367564A2E4C0}"/>
               </a:ext>
             </a:extLst>
           </p:cNvPr>
@@ -1397,24 +1468,22 @@
             <a:spLocks noGrp="1"/>
           </p:cNvSpPr>
           <p:nvPr>
-            <p:ph type="body" sz="quarter" idx="11"/>
+            <p:ph type="body" sz="quarter" idx="10"/>
           </p:nvPr>
         </p:nvSpPr>
         <p:spPr>
           <a:xfrm>
-            <a:off x="1099077" y="2758001"/>
-            <a:ext cx="8493660" cy="2043674"/>
+            <a:off x="1575108" y="2210677"/>
+            <a:ext cx="7541596" cy="4818062"/>
           </a:xfrm>
         </p:spPr>
         <p:txBody>
-          <a:bodyPr>
-            <a:normAutofit lnSpcReduction="10000"/>
-          </a:bodyPr>
+          <a:bodyPr anchor="ctr"/>
           <a:lstStyle/>
           <a:p>
             <a:r>
-              <a:rPr lang="en-GB" sz="14501" dirty="0"/>
-              <a:t>ARENA</a:t>
+              <a:rPr lang="en-GB" sz="11500" dirty="0"/>
+              <a:t>NO ROBOTS BEYOND THIS POINT</a:t>
             </a:r>
           </a:p>
         </p:txBody>
@@ -1422,7 +1491,7 @@
     </p:spTree>
     <p:extLst>
       <p:ext uri="{BB962C8B-B14F-4D97-AF65-F5344CB8AC3E}">
-        <p14:creationId xmlns:p14="http://schemas.microsoft.com/office/powerpoint/2010/main" val="3531657988"/>
+        <p14:creationId xmlns:p14="http://schemas.microsoft.com/office/powerpoint/2010/main" val="537202791"/>
       </p:ext>
     </p:extLst>
   </p:cSld>
@@ -1479,6 +1548,71 @@
           <a:p>
             <a:r>
               <a:rPr lang="en-GB" sz="14501" dirty="0"/>
+              <a:t>ARENA</a:t>
+            </a:r>
+          </a:p>
+        </p:txBody>
+      </p:sp>
+    </p:spTree>
+    <p:extLst>
+      <p:ext uri="{BB962C8B-B14F-4D97-AF65-F5344CB8AC3E}">
+        <p14:creationId xmlns:p14="http://schemas.microsoft.com/office/powerpoint/2010/main" val="3531657988"/>
+      </p:ext>
+    </p:extLst>
+  </p:cSld>
+  <p:clrMapOvr>
+    <a:masterClrMapping/>
+  </p:clrMapOvr>
+</p:sld>
+</file>
+
+<file path=ppt/slides/slide4.xml><?xml version="1.0" encoding="utf-8"?>
+<p:sld xmlns:a="http://schemas.openxmlformats.org/drawingml/2006/main" xmlns:r="http://schemas.openxmlformats.org/officeDocument/2006/relationships" xmlns:p="http://schemas.openxmlformats.org/presentationml/2006/main">
+  <p:cSld>
+    <p:spTree>
+      <p:nvGrpSpPr>
+        <p:cNvPr id="1" name=""/>
+        <p:cNvGrpSpPr/>
+        <p:nvPr/>
+      </p:nvGrpSpPr>
+      <p:grpSpPr>
+        <a:xfrm>
+          <a:off x="0" y="0"/>
+          <a:ext cx="0" cy="0"/>
+          <a:chOff x="0" y="0"/>
+          <a:chExt cx="0" cy="0"/>
+        </a:xfrm>
+      </p:grpSpPr>
+      <p:sp>
+        <p:nvSpPr>
+          <p:cNvPr id="3" name="Text Placeholder 2">
+            <a:extLst>
+              <a:ext uri="{FF2B5EF4-FFF2-40B4-BE49-F238E27FC236}">
+                <a16:creationId xmlns:a16="http://schemas.microsoft.com/office/drawing/2014/main" id="{AE5C0D51-0BCE-42E9-B506-E2501DF53E8F}"/>
+              </a:ext>
+            </a:extLst>
+          </p:cNvPr>
+          <p:cNvSpPr>
+            <a:spLocks noGrp="1"/>
+          </p:cNvSpPr>
+          <p:nvPr>
+            <p:ph type="body" sz="quarter" idx="11"/>
+          </p:nvPr>
+        </p:nvSpPr>
+        <p:spPr>
+          <a:xfrm>
+            <a:off x="1099077" y="2758001"/>
+            <a:ext cx="8493660" cy="2043674"/>
+          </a:xfrm>
+        </p:spPr>
+        <p:txBody>
+          <a:bodyPr>
+            <a:normAutofit lnSpcReduction="10000"/>
+          </a:bodyPr>
+          <a:lstStyle/>
+          <a:p>
+            <a:r>
+              <a:rPr lang="en-GB" sz="14501" dirty="0"/>
               <a:t>HELPDESK</a:t>
             </a:r>
           </a:p>
@@ -1497,7 +1631,7 @@
 </p:sld>
 </file>
 
-<file path=ppt/slides/slide4.xml><?xml version="1.0" encoding="utf-8"?>
+<file path=ppt/slides/slide5.xml><?xml version="1.0" encoding="utf-8"?>
 <p:sld xmlns:a="http://schemas.openxmlformats.org/drawingml/2006/main" xmlns:r="http://schemas.openxmlformats.org/officeDocument/2006/relationships" xmlns:p="http://schemas.openxmlformats.org/presentationml/2006/main">
   <p:cSld>
     <p:spTree>
@@ -1597,7 +1731,7 @@
 </p:sld>
 </file>
 
-<file path=ppt/slides/slide5.xml><?xml version="1.0" encoding="utf-8"?>
+<file path=ppt/slides/slide6.xml><?xml version="1.0" encoding="utf-8"?>
 <p:sld xmlns:a="http://schemas.openxmlformats.org/drawingml/2006/main" xmlns:r="http://schemas.openxmlformats.org/officeDocument/2006/relationships" xmlns:p="http://schemas.openxmlformats.org/presentationml/2006/main">
   <p:cSld>
     <p:spTree>
@@ -1652,70 +1786,6 @@
     <p:extLst>
       <p:ext uri="{BB962C8B-B14F-4D97-AF65-F5344CB8AC3E}">
         <p14:creationId xmlns:p14="http://schemas.microsoft.com/office/powerpoint/2010/main" val="3071498411"/>
-      </p:ext>
-    </p:extLst>
-  </p:cSld>
-  <p:clrMapOvr>
-    <a:masterClrMapping/>
-  </p:clrMapOvr>
-</p:sld>
-</file>
-
-<file path=ppt/slides/slide6.xml><?xml version="1.0" encoding="utf-8"?>
-<p:sld xmlns:a="http://schemas.openxmlformats.org/drawingml/2006/main" xmlns:r="http://schemas.openxmlformats.org/officeDocument/2006/relationships" xmlns:p="http://schemas.openxmlformats.org/presentationml/2006/main">
-  <p:cSld>
-    <p:spTree>
-      <p:nvGrpSpPr>
-        <p:cNvPr id="1" name=""/>
-        <p:cNvGrpSpPr/>
-        <p:nvPr/>
-      </p:nvGrpSpPr>
-      <p:grpSpPr>
-        <a:xfrm>
-          <a:off x="0" y="0"/>
-          <a:ext cx="0" cy="0"/>
-          <a:chOff x="0" y="0"/>
-          <a:chExt cx="0" cy="0"/>
-        </a:xfrm>
-      </p:grpSpPr>
-      <p:sp>
-        <p:nvSpPr>
-          <p:cNvPr id="2" name="Text Placeholder 1">
-            <a:extLst>
-              <a:ext uri="{FF2B5EF4-FFF2-40B4-BE49-F238E27FC236}">
-                <a16:creationId xmlns:a16="http://schemas.microsoft.com/office/drawing/2014/main" id="{C30B016A-7556-446C-9027-ABABC86835C0}"/>
-              </a:ext>
-            </a:extLst>
-          </p:cNvPr>
-          <p:cNvSpPr>
-            <a:spLocks noGrp="1"/>
-          </p:cNvSpPr>
-          <p:nvPr>
-            <p:ph type="body" sz="quarter" idx="10"/>
-          </p:nvPr>
-        </p:nvSpPr>
-        <p:spPr>
-          <a:xfrm>
-            <a:off x="726281" y="3097782"/>
-            <a:ext cx="9239249" cy="3098302"/>
-          </a:xfrm>
-        </p:spPr>
-        <p:txBody>
-          <a:bodyPr/>
-          <a:lstStyle/>
-          <a:p>
-            <a:r>
-              <a:rPr lang="en-GB" sz="13800" dirty="0"/>
-              <a:t>STAGING IN</a:t>
-            </a:r>
-            <a:endParaRPr lang="en-GB" sz="6600" dirty="0"/>
-          </a:p>
-        </p:txBody>
-      </p:sp>
-    </p:spTree>
-    <p:extLst>
-      <p:ext uri="{BB962C8B-B14F-4D97-AF65-F5344CB8AC3E}">
-        <p14:creationId xmlns:p14="http://schemas.microsoft.com/office/powerpoint/2010/main" val="1098096009"/>
       </p:ext>
     </p:extLst>
   </p:cSld>
@@ -1760,7 +1830,7 @@
         </p:nvSpPr>
         <p:spPr>
           <a:xfrm>
-            <a:off x="726281" y="3138725"/>
+            <a:off x="726281" y="3097782"/>
             <a:ext cx="9239249" cy="3098302"/>
           </a:xfrm>
         </p:spPr>
@@ -1770,7 +1840,7 @@
           <a:p>
             <a:r>
               <a:rPr lang="en-GB" sz="13800" dirty="0"/>
-              <a:t>STAGING OUT</a:t>
+              <a:t>STAGING IN</a:t>
             </a:r>
             <a:endParaRPr lang="en-GB" sz="6600" dirty="0"/>
           </a:p>
@@ -1779,7 +1849,7 @@
     </p:spTree>
     <p:extLst>
       <p:ext uri="{BB962C8B-B14F-4D97-AF65-F5344CB8AC3E}">
-        <p14:creationId xmlns:p14="http://schemas.microsoft.com/office/powerpoint/2010/main" val="3202793763"/>
+        <p14:creationId xmlns:p14="http://schemas.microsoft.com/office/powerpoint/2010/main" val="1098096009"/>
       </p:ext>
     </p:extLst>
   </p:cSld>
@@ -1824,7 +1894,7 @@
         </p:nvSpPr>
         <p:spPr>
           <a:xfrm>
-            <a:off x="726281" y="3029544"/>
+            <a:off x="726281" y="3138725"/>
             <a:ext cx="9239249" cy="3098302"/>
           </a:xfrm>
         </p:spPr>
@@ -1833,17 +1903,17 @@
           <a:lstStyle/>
           <a:p>
             <a:r>
-              <a:rPr lang="en-GB" sz="16600" dirty="0"/>
-              <a:t>QUIET ZONE</a:t>
+              <a:rPr lang="en-GB" sz="13800" dirty="0"/>
+              <a:t>STAGING OUT</a:t>
             </a:r>
-            <a:endParaRPr lang="en-GB" sz="7200" dirty="0"/>
+            <a:endParaRPr lang="en-GB" sz="6600" dirty="0"/>
           </a:p>
         </p:txBody>
       </p:sp>
     </p:spTree>
     <p:extLst>
       <p:ext uri="{BB962C8B-B14F-4D97-AF65-F5344CB8AC3E}">
-        <p14:creationId xmlns:p14="http://schemas.microsoft.com/office/powerpoint/2010/main" val="18492442"/>
+        <p14:creationId xmlns:p14="http://schemas.microsoft.com/office/powerpoint/2010/main" val="3202793763"/>
       </p:ext>
     </p:extLst>
   </p:cSld>
@@ -1888,8 +1958,8 @@
         </p:nvSpPr>
         <p:spPr>
           <a:xfrm>
-            <a:off x="726281" y="2647405"/>
-            <a:ext cx="9239249" cy="3794337"/>
+            <a:off x="726281" y="3029544"/>
+            <a:ext cx="9239249" cy="3098302"/>
           </a:xfrm>
         </p:spPr>
         <p:txBody>
@@ -1897,23 +1967,17 @@
           <a:lstStyle/>
           <a:p>
             <a:r>
-              <a:rPr lang="en-GB" sz="11500" dirty="0"/>
-              <a:t>POWER TOOLS</a:t>
+              <a:rPr lang="en-GB" sz="16600" dirty="0"/>
+              <a:t>QUIET ZONE</a:t>
             </a:r>
-          </a:p>
-          <a:p>
-            <a:r>
-              <a:rPr lang="en-GB" sz="11500" dirty="0"/>
-              <a:t>AREA</a:t>
-            </a:r>
-            <a:endParaRPr lang="en-GB" sz="6000" dirty="0"/>
+            <a:endParaRPr lang="en-GB" sz="7200" dirty="0"/>
           </a:p>
         </p:txBody>
       </p:sp>
     </p:spTree>
     <p:extLst>
       <p:ext uri="{BB962C8B-B14F-4D97-AF65-F5344CB8AC3E}">
-        <p14:creationId xmlns:p14="http://schemas.microsoft.com/office/powerpoint/2010/main" val="3020136911"/>
+        <p14:creationId xmlns:p14="http://schemas.microsoft.com/office/powerpoint/2010/main" val="18492442"/>
       </p:ext>
     </p:extLst>
   </p:cSld>

</xml_diff>